<commit_message>
Update diagram to include c&c
</commit_message>
<xml_diff>
--- a/diagrams/architecture_diagram.pptx
+++ b/diagrams/architecture_diagram.pptx
@@ -106,6 +106,11 @@
       </a:defRPr>
     </a:lvl9pPr>
   </p:defaultTextStyle>
+  <p:extLst>
+    <p:ext uri="{EFAFB233-063F-42B5-8137-9DF3F51BA10A}">
+      <p15:sldGuideLst xmlns:p15="http://schemas.microsoft.com/office/powerpoint/2012/main"/>
+    </p:ext>
+  </p:extLst>
 </p:presentation>
 </file>
 
@@ -3914,6 +3919,36 @@
           </a:p>
         </p:txBody>
       </p:sp>
+      <p:pic>
+        <p:nvPicPr>
+          <p:cNvPr id="2" name="Picture 1">
+            <a:extLst>
+              <a:ext uri="{FF2B5EF4-FFF2-40B4-BE49-F238E27FC236}">
+                <a16:creationId xmlns:a16="http://schemas.microsoft.com/office/drawing/2014/main" id="{EA913BDF-618D-4F96-BD8F-AA1A9A8A50B3}"/>
+              </a:ext>
+            </a:extLst>
+          </p:cNvPr>
+          <p:cNvPicPr>
+            <a:picLocks/>
+          </p:cNvPicPr>
+          <p:nvPr/>
+        </p:nvPicPr>
+        <p:blipFill>
+          <a:blip r:embed="rId2"/>
+          <a:stretch>
+            <a:fillRect/>
+          </a:stretch>
+        </p:blipFill>
+        <p:spPr>
+          <a:xfrm>
+            <a:off x="1192494" y="-28179"/>
+            <a:ext cx="10711551" cy="6713621"/>
+          </a:xfrm>
+          <a:prstGeom prst="rect">
+            <a:avLst/>
+          </a:prstGeom>
+        </p:spPr>
+      </p:pic>
       <p:sp>
         <p:nvSpPr>
           <p:cNvPr id="38" name="Freeform: Shape 37">
@@ -4131,36 +4166,6 @@
       </p:sp>
       <p:pic>
         <p:nvPicPr>
-          <p:cNvPr id="7" name="Picture 6">
-            <a:extLst>
-              <a:ext uri="{FF2B5EF4-FFF2-40B4-BE49-F238E27FC236}">
-                <a16:creationId xmlns:a16="http://schemas.microsoft.com/office/drawing/2014/main" id="{6C2F4695-C51E-438D-AE01-4AAB1C9C10B1}"/>
-              </a:ext>
-            </a:extLst>
-          </p:cNvPr>
-          <p:cNvPicPr>
-            <a:picLocks/>
-          </p:cNvPicPr>
-          <p:nvPr/>
-        </p:nvPicPr>
-        <p:blipFill>
-          <a:blip r:embed="rId2"/>
-          <a:stretch>
-            <a:fillRect/>
-          </a:stretch>
-        </p:blipFill>
-        <p:spPr>
-          <a:xfrm>
-            <a:off x="1212137" y="0"/>
-            <a:ext cx="10001295" cy="6749716"/>
-          </a:xfrm>
-          <a:prstGeom prst="rect">
-            <a:avLst/>
-          </a:prstGeom>
-        </p:spPr>
-      </p:pic>
-      <p:pic>
-        <p:nvPicPr>
           <p:cNvPr id="1028" name="Picture 4">
             <a:extLst>
               <a:ext uri="{FF2B5EF4-FFF2-40B4-BE49-F238E27FC236}">
@@ -4188,8 +4193,8 @@
         </p:blipFill>
         <p:spPr bwMode="auto">
           <a:xfrm>
-            <a:off x="9199397" y="3141196"/>
-            <a:ext cx="771525" cy="771525"/>
+            <a:off x="8333123" y="3958229"/>
+            <a:ext cx="690561" cy="690561"/>
           </a:xfrm>
           <a:prstGeom prst="rect">
             <a:avLst/>
@@ -4206,6 +4211,89 @@
           </a:extLst>
         </p:spPr>
       </p:pic>
+      <p:pic>
+        <p:nvPicPr>
+          <p:cNvPr id="1026" name="Picture 2">
+            <a:extLst>
+              <a:ext uri="{FF2B5EF4-FFF2-40B4-BE49-F238E27FC236}">
+                <a16:creationId xmlns:a16="http://schemas.microsoft.com/office/drawing/2014/main" id="{C2099B2B-8633-4639-BD7E-1578CD5B9584}"/>
+              </a:ext>
+            </a:extLst>
+          </p:cNvPr>
+          <p:cNvPicPr>
+            <a:picLocks noChangeAspect="1" noChangeArrowheads="1"/>
+          </p:cNvPicPr>
+          <p:nvPr/>
+        </p:nvPicPr>
+        <p:blipFill>
+          <a:blip r:embed="rId4">
+            <a:extLst>
+              <a:ext uri="{28A0092B-C50C-407E-A947-70E740481C1C}">
+                <a14:useLocalDpi xmlns:a14="http://schemas.microsoft.com/office/drawing/2010/main" val="0"/>
+              </a:ext>
+            </a:extLst>
+          </a:blip>
+          <a:srcRect/>
+          <a:stretch>
+            <a:fillRect/>
+          </a:stretch>
+        </p:blipFill>
+        <p:spPr bwMode="auto">
+          <a:xfrm>
+            <a:off x="10518436" y="2297258"/>
+            <a:ext cx="851406" cy="851406"/>
+          </a:xfrm>
+          <a:prstGeom prst="rect">
+            <a:avLst/>
+          </a:prstGeom>
+          <a:noFill/>
+          <a:extLst>
+            <a:ext uri="{909E8E84-426E-40DD-AFC4-6F175D3DCCD1}">
+              <a14:hiddenFill xmlns:a14="http://schemas.microsoft.com/office/drawing/2010/main">
+                <a:solidFill>
+                  <a:srgbClr val="FFFFFF"/>
+                </a:solidFill>
+              </a14:hiddenFill>
+            </a:ext>
+          </a:extLst>
+        </p:spPr>
+      </p:pic>
+      <p:sp>
+        <p:nvSpPr>
+          <p:cNvPr id="3" name="TextBox 2">
+            <a:extLst>
+              <a:ext uri="{FF2B5EF4-FFF2-40B4-BE49-F238E27FC236}">
+                <a16:creationId xmlns:a16="http://schemas.microsoft.com/office/drawing/2014/main" id="{70B61494-D99E-4229-9618-D8970B3088A4}"/>
+              </a:ext>
+            </a:extLst>
+          </p:cNvPr>
+          <p:cNvSpPr txBox="1"/>
+          <p:nvPr/>
+        </p:nvSpPr>
+        <p:spPr>
+          <a:xfrm>
+            <a:off x="8855242" y="4303509"/>
+            <a:ext cx="692818" cy="230832"/>
+          </a:xfrm>
+          <a:prstGeom prst="rect">
+            <a:avLst/>
+          </a:prstGeom>
+          <a:noFill/>
+        </p:spPr>
+        <p:txBody>
+          <a:bodyPr wrap="none" rtlCol="0">
+            <a:spAutoFit/>
+          </a:bodyPr>
+          <a:lstStyle/>
+          <a:p>
+            <a:r>
+              <a:rPr lang="en-GB" sz="900" dirty="0"/>
+              <a:t>Dashboard</a:t>
+            </a:r>
+            <a:endParaRPr lang="en-GB" sz="1050" dirty="0"/>
+          </a:p>
+        </p:txBody>
+      </p:sp>
     </p:spTree>
     <p:extLst>
       <p:ext uri="{BB962C8B-B14F-4D97-AF65-F5344CB8AC3E}">
@@ -7998,7 +8086,7 @@
 
 <file path=ppt/webextensions/taskpanes.xml><?xml version="1.0" encoding="utf-8"?>
 <wetp:taskpanes xmlns:wetp="http://schemas.microsoft.com/office/webextensions/taskpanes/2010/11">
-  <wetp:taskpane dockstate="right" visibility="0" width="350" row="4">
+  <wetp:taskpane dockstate="right" visibility="0" width="350" row="2">
     <wetp:webextensionref xmlns:r="http://schemas.openxmlformats.org/officeDocument/2006/relationships" r:id="rId1"/>
   </wetp:taskpane>
 </wetp:taskpanes>

</xml_diff>